<commit_message>
I am tired af.
</commit_message>
<xml_diff>
--- a/docs/CS1/task07/Presentation_Task_7.pptx
+++ b/docs/CS1/task07/Presentation_Task_7.pptx
@@ -5,14 +5,19 @@
     <p:sldMasterId id="2147483870" r:id="rId1"/>
   </p:sldMasterIdLst>
   <p:notesMasterIdLst>
-    <p:notesMasterId r:id="rId7"/>
+    <p:notesMasterId r:id="rId12"/>
   </p:notesMasterIdLst>
   <p:sldIdLst>
     <p:sldId id="256" r:id="rId2"/>
     <p:sldId id="257" r:id="rId3"/>
     <p:sldId id="258" r:id="rId4"/>
     <p:sldId id="260" r:id="rId5"/>
-    <p:sldId id="259" r:id="rId6"/>
+    <p:sldId id="264" r:id="rId6"/>
+    <p:sldId id="265" r:id="rId7"/>
+    <p:sldId id="261" r:id="rId8"/>
+    <p:sldId id="266" r:id="rId9"/>
+    <p:sldId id="267" r:id="rId10"/>
+    <p:sldId id="268" r:id="rId11"/>
   </p:sldIdLst>
   <p:sldSz cx="12192000" cy="6858000"/>
   <p:notesSz cx="6858000" cy="9144000"/>
@@ -216,7 +221,7 @@
           <a:p>
             <a:fld id="{BF75C9B3-8DFD-4D8D-A621-6446D25FF5D3}" type="datetimeFigureOut">
               <a:rPr lang="en-US" smtClean="0"/>
-              <a:t>4/6/2017</a:t>
+              <a:t>4/7/2017</a:t>
             </a:fld>
             <a:endParaRPr lang="en-US"/>
           </a:p>
@@ -374,7 +379,7 @@
           <a:p>
             <a:fld id="{74DF4878-7372-4426-AAF7-0361376526BB}" type="slidenum">
               <a:rPr lang="en-US" smtClean="0"/>
-              <a:t>‹Nr.›</a:t>
+              <a:t>‹#›</a:t>
             </a:fld>
             <a:endParaRPr lang="en-US"/>
           </a:p>
@@ -864,7 +869,7 @@
           <a:p>
             <a:fld id="{67B926F0-54F8-4A58-BAAD-23E529B91028}" type="datetimeFigureOut">
               <a:rPr lang="de-CH" smtClean="0"/>
-              <a:t>06.04.2017</a:t>
+              <a:t>07.04.2017</a:t>
             </a:fld>
             <a:endParaRPr lang="de-CH"/>
           </a:p>
@@ -906,7 +911,7 @@
           <a:p>
             <a:fld id="{B2BF1C58-9544-48E0-B99F-9F97FF3E222C}" type="slidenum">
               <a:rPr lang="de-CH" smtClean="0"/>
-              <a:t>‹Nr.›</a:t>
+              <a:t>‹#›</a:t>
             </a:fld>
             <a:endParaRPr lang="de-CH"/>
           </a:p>
@@ -1032,7 +1037,7 @@
           <a:p>
             <a:fld id="{67B926F0-54F8-4A58-BAAD-23E529B91028}" type="datetimeFigureOut">
               <a:rPr lang="de-CH" smtClean="0"/>
-              <a:t>06.04.2017</a:t>
+              <a:t>07.04.2017</a:t>
             </a:fld>
             <a:endParaRPr lang="de-CH"/>
           </a:p>
@@ -1074,7 +1079,7 @@
           <a:p>
             <a:fld id="{B2BF1C58-9544-48E0-B99F-9F97FF3E222C}" type="slidenum">
               <a:rPr lang="de-CH" smtClean="0"/>
-              <a:t>‹Nr.›</a:t>
+              <a:t>‹#›</a:t>
             </a:fld>
             <a:endParaRPr lang="de-CH"/>
           </a:p>
@@ -1210,7 +1215,7 @@
           <a:p>
             <a:fld id="{67B926F0-54F8-4A58-BAAD-23E529B91028}" type="datetimeFigureOut">
               <a:rPr lang="de-CH" smtClean="0"/>
-              <a:t>06.04.2017</a:t>
+              <a:t>07.04.2017</a:t>
             </a:fld>
             <a:endParaRPr lang="de-CH"/>
           </a:p>
@@ -1252,7 +1257,7 @@
           <a:p>
             <a:fld id="{B2BF1C58-9544-48E0-B99F-9F97FF3E222C}" type="slidenum">
               <a:rPr lang="de-CH" smtClean="0"/>
-              <a:t>‹Nr.›</a:t>
+              <a:t>‹#›</a:t>
             </a:fld>
             <a:endParaRPr lang="de-CH"/>
           </a:p>
@@ -1378,7 +1383,7 @@
           <a:p>
             <a:fld id="{67B926F0-54F8-4A58-BAAD-23E529B91028}" type="datetimeFigureOut">
               <a:rPr lang="de-CH" smtClean="0"/>
-              <a:t>06.04.2017</a:t>
+              <a:t>07.04.2017</a:t>
             </a:fld>
             <a:endParaRPr lang="de-CH"/>
           </a:p>
@@ -1420,7 +1425,7 @@
           <a:p>
             <a:fld id="{B2BF1C58-9544-48E0-B99F-9F97FF3E222C}" type="slidenum">
               <a:rPr lang="de-CH" smtClean="0"/>
-              <a:t>‹Nr.›</a:t>
+              <a:t>‹#›</a:t>
             </a:fld>
             <a:endParaRPr lang="de-CH"/>
           </a:p>
@@ -1623,7 +1628,7 @@
           <a:p>
             <a:fld id="{67B926F0-54F8-4A58-BAAD-23E529B91028}" type="datetimeFigureOut">
               <a:rPr lang="de-CH" smtClean="0"/>
-              <a:t>06.04.2017</a:t>
+              <a:t>07.04.2017</a:t>
             </a:fld>
             <a:endParaRPr lang="de-CH"/>
           </a:p>
@@ -1665,7 +1670,7 @@
           <a:p>
             <a:fld id="{B2BF1C58-9544-48E0-B99F-9F97FF3E222C}" type="slidenum">
               <a:rPr lang="de-CH" smtClean="0"/>
-              <a:t>‹Nr.›</a:t>
+              <a:t>‹#›</a:t>
             </a:fld>
             <a:endParaRPr lang="de-CH"/>
           </a:p>
@@ -1852,7 +1857,7 @@
           <a:p>
             <a:fld id="{67B926F0-54F8-4A58-BAAD-23E529B91028}" type="datetimeFigureOut">
               <a:rPr lang="de-CH" smtClean="0"/>
-              <a:t>06.04.2017</a:t>
+              <a:t>07.04.2017</a:t>
             </a:fld>
             <a:endParaRPr lang="de-CH"/>
           </a:p>
@@ -1894,7 +1899,7 @@
           <a:p>
             <a:fld id="{B2BF1C58-9544-48E0-B99F-9F97FF3E222C}" type="slidenum">
               <a:rPr lang="de-CH" smtClean="0"/>
-              <a:t>‹Nr.›</a:t>
+              <a:t>‹#›</a:t>
             </a:fld>
             <a:endParaRPr lang="de-CH"/>
           </a:p>
@@ -2216,7 +2221,7 @@
           <a:p>
             <a:fld id="{67B926F0-54F8-4A58-BAAD-23E529B91028}" type="datetimeFigureOut">
               <a:rPr lang="de-CH" smtClean="0"/>
-              <a:t>06.04.2017</a:t>
+              <a:t>07.04.2017</a:t>
             </a:fld>
             <a:endParaRPr lang="de-CH"/>
           </a:p>
@@ -2258,7 +2263,7 @@
           <a:p>
             <a:fld id="{B2BF1C58-9544-48E0-B99F-9F97FF3E222C}" type="slidenum">
               <a:rPr lang="de-CH" smtClean="0"/>
-              <a:t>‹Nr.›</a:t>
+              <a:t>‹#›</a:t>
             </a:fld>
             <a:endParaRPr lang="de-CH"/>
           </a:p>
@@ -2333,7 +2338,7 @@
           <a:p>
             <a:fld id="{67B926F0-54F8-4A58-BAAD-23E529B91028}" type="datetimeFigureOut">
               <a:rPr lang="de-CH" smtClean="0"/>
-              <a:t>06.04.2017</a:t>
+              <a:t>07.04.2017</a:t>
             </a:fld>
             <a:endParaRPr lang="de-CH"/>
           </a:p>
@@ -2375,7 +2380,7 @@
           <a:p>
             <a:fld id="{B2BF1C58-9544-48E0-B99F-9F97FF3E222C}" type="slidenum">
               <a:rPr lang="de-CH" smtClean="0"/>
-              <a:t>‹Nr.›</a:t>
+              <a:t>‹#›</a:t>
             </a:fld>
             <a:endParaRPr lang="de-CH"/>
           </a:p>
@@ -2428,7 +2433,7 @@
           <a:p>
             <a:fld id="{67B926F0-54F8-4A58-BAAD-23E529B91028}" type="datetimeFigureOut">
               <a:rPr lang="de-CH" smtClean="0"/>
-              <a:t>06.04.2017</a:t>
+              <a:t>07.04.2017</a:t>
             </a:fld>
             <a:endParaRPr lang="de-CH"/>
           </a:p>
@@ -2470,7 +2475,7 @@
           <a:p>
             <a:fld id="{B2BF1C58-9544-48E0-B99F-9F97FF3E222C}" type="slidenum">
               <a:rPr lang="de-CH" smtClean="0"/>
-              <a:t>‹Nr.›</a:t>
+              <a:t>‹#›</a:t>
             </a:fld>
             <a:endParaRPr lang="de-CH"/>
           </a:p>
@@ -2703,7 +2708,7 @@
           <a:p>
             <a:fld id="{67B926F0-54F8-4A58-BAAD-23E529B91028}" type="datetimeFigureOut">
               <a:rPr lang="de-CH" smtClean="0"/>
-              <a:t>06.04.2017</a:t>
+              <a:t>07.04.2017</a:t>
             </a:fld>
             <a:endParaRPr lang="de-CH"/>
           </a:p>
@@ -2745,7 +2750,7 @@
           <a:p>
             <a:fld id="{B2BF1C58-9544-48E0-B99F-9F97FF3E222C}" type="slidenum">
               <a:rPr lang="de-CH" smtClean="0"/>
-              <a:t>‹Nr.›</a:t>
+              <a:t>‹#›</a:t>
             </a:fld>
             <a:endParaRPr lang="de-CH"/>
           </a:p>
@@ -2955,7 +2960,7 @@
           <a:p>
             <a:fld id="{67B926F0-54F8-4A58-BAAD-23E529B91028}" type="datetimeFigureOut">
               <a:rPr lang="de-CH" smtClean="0"/>
-              <a:t>06.04.2017</a:t>
+              <a:t>07.04.2017</a:t>
             </a:fld>
             <a:endParaRPr lang="de-CH"/>
           </a:p>
@@ -2997,7 +3002,7 @@
           <a:p>
             <a:fld id="{B2BF1C58-9544-48E0-B99F-9F97FF3E222C}" type="slidenum">
               <a:rPr lang="de-CH" smtClean="0"/>
-              <a:t>‹Nr.›</a:t>
+              <a:t>‹#›</a:t>
             </a:fld>
             <a:endParaRPr lang="de-CH"/>
           </a:p>
@@ -3166,7 +3171,7 @@
           <a:p>
             <a:fld id="{67B926F0-54F8-4A58-BAAD-23E529B91028}" type="datetimeFigureOut">
               <a:rPr lang="de-CH" smtClean="0"/>
-              <a:t>06.04.2017</a:t>
+              <a:t>07.04.2017</a:t>
             </a:fld>
             <a:endParaRPr lang="de-CH"/>
           </a:p>
@@ -3244,7 +3249,7 @@
           <a:p>
             <a:fld id="{B2BF1C58-9544-48E0-B99F-9F97FF3E222C}" type="slidenum">
               <a:rPr lang="de-CH" smtClean="0"/>
-              <a:t>‹Nr.›</a:t>
+              <a:t>‹#›</a:t>
             </a:fld>
             <a:endParaRPr lang="de-CH"/>
           </a:p>
@@ -3588,7 +3593,7 @@
           <a:p>
             <a:r>
               <a:rPr lang="de-CH" dirty="0"/>
-              <a:t>MHC PMS Task3</a:t>
+              <a:t>MHC PMS Task 7</a:t>
             </a:r>
           </a:p>
         </p:txBody>
@@ -3610,7 +3615,7 @@
           <a:p>
             <a:r>
               <a:rPr lang="de-CH" dirty="0"/>
-              <a:t>Gruppe Rot</a:t>
+              <a:t>Group Red</a:t>
             </a:r>
           </a:p>
         </p:txBody>
@@ -3619,6 +3624,97 @@
     <p:extLst>
       <p:ext uri="{BB962C8B-B14F-4D97-AF65-F5344CB8AC3E}">
         <p14:creationId xmlns:p14="http://schemas.microsoft.com/office/powerpoint/2010/main" val="1564265436"/>
+      </p:ext>
+    </p:extLst>
+  </p:cSld>
+  <p:clrMapOvr>
+    <a:masterClrMapping/>
+  </p:clrMapOvr>
+</p:sld>
+</file>
+
+<file path=ppt/slides/slide10.xml><?xml version="1.0" encoding="utf-8"?>
+<p:sld xmlns:a="http://schemas.openxmlformats.org/drawingml/2006/main" xmlns:r="http://schemas.openxmlformats.org/officeDocument/2006/relationships" xmlns:p="http://schemas.openxmlformats.org/presentationml/2006/main">
+  <p:cSld>
+    <p:spTree>
+      <p:nvGrpSpPr>
+        <p:cNvPr id="1" name=""/>
+        <p:cNvGrpSpPr/>
+        <p:nvPr/>
+      </p:nvGrpSpPr>
+      <p:grpSpPr>
+        <a:xfrm>
+          <a:off x="0" y="0"/>
+          <a:ext cx="0" cy="0"/>
+          <a:chOff x="0" y="0"/>
+          <a:chExt cx="0" cy="0"/>
+        </a:xfrm>
+      </p:grpSpPr>
+      <p:sp>
+        <p:nvSpPr>
+          <p:cNvPr id="2" name="Title 1"/>
+          <p:cNvSpPr>
+            <a:spLocks noGrp="1"/>
+          </p:cNvSpPr>
+          <p:nvPr>
+            <p:ph type="title"/>
+          </p:nvPr>
+        </p:nvSpPr>
+        <p:spPr/>
+        <p:txBody>
+          <a:bodyPr/>
+          <a:lstStyle/>
+          <a:p>
+            <a:r>
+              <a:rPr lang="en-US" dirty="0"/>
+              <a:t>Verdict</a:t>
+            </a:r>
+            <a:endParaRPr lang="de-CH" dirty="0"/>
+          </a:p>
+        </p:txBody>
+      </p:sp>
+      <p:sp>
+        <p:nvSpPr>
+          <p:cNvPr id="3" name="Content Placeholder 2"/>
+          <p:cNvSpPr>
+            <a:spLocks noGrp="1"/>
+          </p:cNvSpPr>
+          <p:nvPr>
+            <p:ph idx="1"/>
+          </p:nvPr>
+        </p:nvSpPr>
+        <p:spPr/>
+        <p:txBody>
+          <a:bodyPr/>
+          <a:lstStyle/>
+          <a:p>
+            <a:r>
+              <a:rPr lang="en-US" dirty="0"/>
+              <a:t>CRC cards may be a good idea</a:t>
+            </a:r>
+          </a:p>
+          <a:p>
+            <a:endParaRPr lang="en-US" dirty="0"/>
+          </a:p>
+          <a:p>
+            <a:r>
+              <a:rPr lang="en-US" dirty="0"/>
+              <a:t>Somewhat out of touch with reality</a:t>
+            </a:r>
+          </a:p>
+          <a:p>
+            <a:r>
+              <a:rPr lang="en-US" dirty="0"/>
+              <a:t>Feels like waterfall model</a:t>
+            </a:r>
+            <a:endParaRPr lang="de-CH" dirty="0"/>
+          </a:p>
+        </p:txBody>
+      </p:sp>
+    </p:spTree>
+    <p:extLst>
+      <p:ext uri="{BB962C8B-B14F-4D97-AF65-F5344CB8AC3E}">
+        <p14:creationId xmlns:p14="http://schemas.microsoft.com/office/powerpoint/2010/main" val="921141549"/>
       </p:ext>
     </p:extLst>
   </p:cSld>
@@ -3655,14 +3751,19 @@
             <p:ph type="title"/>
           </p:nvPr>
         </p:nvSpPr>
-        <p:spPr/>
+        <p:spPr>
+          <a:xfrm>
+            <a:off x="838200" y="365125"/>
+            <a:ext cx="10515600" cy="1325563"/>
+          </a:xfrm>
+        </p:spPr>
         <p:txBody>
           <a:bodyPr/>
           <a:lstStyle/>
           <a:p>
             <a:r>
               <a:rPr lang="de-CH" dirty="0"/>
-              <a:t>Übersicht</a:t>
+              <a:t>Overview</a:t>
             </a:r>
           </a:p>
         </p:txBody>
@@ -3677,26 +3778,53 @@
             <p:ph idx="1"/>
           </p:nvPr>
         </p:nvSpPr>
-        <p:spPr/>
+        <p:spPr>
+          <a:xfrm>
+            <a:off x="838200" y="1825625"/>
+            <a:ext cx="10515600" cy="4351338"/>
+          </a:xfrm>
+        </p:spPr>
         <p:txBody>
           <a:bodyPr/>
           <a:lstStyle/>
           <a:p>
             <a:r>
               <a:rPr lang="de-CH" dirty="0"/>
-              <a:t>Vorgehen</a:t>
+              <a:t>Approach</a:t>
             </a:r>
           </a:p>
           <a:p>
             <a:r>
               <a:rPr lang="de-CH" dirty="0"/>
-              <a:t>Ergebnisse</a:t>
-            </a:r>
-          </a:p>
-          <a:p>
-            <a:r>
-              <a:rPr lang="de-CH" dirty="0" smtClean="0"/>
-              <a:t>Fazit</a:t>
+              <a:t>Results</a:t>
+            </a:r>
+          </a:p>
+          <a:p>
+            <a:pPr lvl="1"/>
+            <a:r>
+              <a:rPr lang="en-US" dirty="0"/>
+              <a:t>Some CRC cards</a:t>
+            </a:r>
+          </a:p>
+          <a:p>
+            <a:pPr lvl="1"/>
+            <a:r>
+              <a:rPr lang="en-US" dirty="0"/>
+              <a:t>Domain model</a:t>
+            </a:r>
+          </a:p>
+          <a:p>
+            <a:pPr lvl="1"/>
+            <a:r>
+              <a:rPr lang="en-US" dirty="0"/>
+              <a:t>Sequence diagram</a:t>
+            </a:r>
+            <a:endParaRPr lang="de-CH" dirty="0"/>
+          </a:p>
+          <a:p>
+            <a:r>
+              <a:rPr lang="de-CH" dirty="0"/>
+              <a:t>Verdict</a:t>
             </a:r>
             <a:endParaRPr lang="en-US" dirty="0"/>
           </a:p>
@@ -3705,6 +3833,45 @@
           </a:p>
         </p:txBody>
       </p:sp>
+      <p:pic>
+        <p:nvPicPr>
+          <p:cNvPr id="4" name="Picture 2" descr="Image result for geek and poke requirements"/>
+          <p:cNvPicPr>
+            <a:picLocks noChangeAspect="1" noChangeArrowheads="1"/>
+          </p:cNvPicPr>
+          <p:nvPr/>
+        </p:nvPicPr>
+        <p:blipFill rotWithShape="1">
+          <a:blip r:embed="rId3" cstate="print">
+            <a:extLst>
+              <a:ext uri="{28A0092B-C50C-407E-A947-70E740481C1C}">
+                <a14:useLocalDpi xmlns:a14="http://schemas.microsoft.com/office/drawing/2010/main" val="0"/>
+              </a:ext>
+            </a:extLst>
+          </a:blip>
+          <a:srcRect t="14510"/>
+          <a:stretch/>
+        </p:blipFill>
+        <p:spPr bwMode="auto">
+          <a:xfrm>
+            <a:off x="6654216" y="703943"/>
+            <a:ext cx="4524057" cy="5473020"/>
+          </a:xfrm>
+          <a:prstGeom prst="rect">
+            <a:avLst/>
+          </a:prstGeom>
+          <a:noFill/>
+          <a:extLst>
+            <a:ext uri="{909E8E84-426E-40DD-AFC4-6F175D3DCCD1}">
+              <a14:hiddenFill xmlns:a14="http://schemas.microsoft.com/office/drawing/2010/main">
+                <a:solidFill>
+                  <a:srgbClr val="FFFFFF"/>
+                </a:solidFill>
+              </a14:hiddenFill>
+            </a:ext>
+          </a:extLst>
+        </p:spPr>
+      </p:pic>
     </p:spTree>
     <p:extLst>
       <p:ext uri="{BB962C8B-B14F-4D97-AF65-F5344CB8AC3E}">
@@ -3745,49 +3912,72 @@
             <p:ph type="title"/>
           </p:nvPr>
         </p:nvSpPr>
-        <p:spPr/>
-        <p:txBody>
-          <a:bodyPr/>
-          <a:lstStyle/>
-          <a:p>
-            <a:r>
-              <a:rPr lang="de-CH" dirty="0" smtClean="0"/>
-              <a:t>Vorgehen</a:t>
+        <p:spPr>
+          <a:xfrm>
+            <a:off x="838200" y="365125"/>
+            <a:ext cx="10515600" cy="1325563"/>
+          </a:xfrm>
+        </p:spPr>
+        <p:txBody>
+          <a:bodyPr/>
+          <a:lstStyle/>
+          <a:p>
+            <a:r>
+              <a:rPr lang="de-CH" dirty="0"/>
+              <a:t>Approach</a:t>
+            </a:r>
+          </a:p>
+        </p:txBody>
+      </p:sp>
+      <p:sp>
+        <p:nvSpPr>
+          <p:cNvPr id="8" name="Inhaltsplatzhalter 7"/>
+          <p:cNvSpPr>
+            <a:spLocks noGrp="1"/>
+          </p:cNvSpPr>
+          <p:nvPr>
+            <p:ph sz="half" idx="1"/>
+          </p:nvPr>
+        </p:nvSpPr>
+        <p:spPr>
+          <a:xfrm>
+            <a:off x="838200" y="1825625"/>
+            <a:ext cx="5181600" cy="4351338"/>
+          </a:xfrm>
+        </p:spPr>
+        <p:txBody>
+          <a:bodyPr/>
+          <a:lstStyle/>
+          <a:p>
+            <a:r>
+              <a:rPr lang="de-CH" dirty="0"/>
+              <a:t>What </a:t>
+            </a:r>
+            <a:r>
+              <a:rPr lang="de-CH"/>
+              <a:t>entities </a:t>
+            </a:r>
+            <a:r>
+              <a:rPr lang="de-CH" dirty="0"/>
+              <a:t>do </a:t>
+            </a:r>
+            <a:r>
+              <a:rPr lang="de-CH"/>
+              <a:t>we need?</a:t>
             </a:r>
             <a:endParaRPr lang="de-CH" dirty="0"/>
           </a:p>
-        </p:txBody>
-      </p:sp>
-      <p:sp>
-        <p:nvSpPr>
-          <p:cNvPr id="8" name="Inhaltsplatzhalter 7"/>
-          <p:cNvSpPr>
-            <a:spLocks noGrp="1"/>
-          </p:cNvSpPr>
-          <p:nvPr>
-            <p:ph sz="half" idx="1"/>
-          </p:nvPr>
-        </p:nvSpPr>
-        <p:spPr/>
-        <p:txBody>
-          <a:bodyPr/>
-          <a:lstStyle/>
-          <a:p>
-            <a:r>
-              <a:rPr lang="de-CH" dirty="0" smtClean="0"/>
-              <a:t>Was gibt es alle für Entitäten?</a:t>
-            </a:r>
-          </a:p>
-          <a:p>
-            <a:r>
-              <a:rPr lang="de-CH" dirty="0" smtClean="0"/>
-              <a:t>Brainstorming an Whiteboard</a:t>
-            </a:r>
-          </a:p>
-          <a:p>
-            <a:r>
-              <a:rPr lang="de-CH" dirty="0" smtClean="0"/>
-              <a:t>Erste Gedanken zu Beziehungen</a:t>
+          <a:p>
+            <a:r>
+              <a:rPr lang="de-CH"/>
+              <a:t>Brainstorming</a:t>
+            </a:r>
+            <a:endParaRPr lang="de-CH" dirty="0"/>
+          </a:p>
+          <a:p>
+            <a:r>
+              <a:rPr lang="de-CH"/>
+              <a:t>Thoughts on associations</a:t>
             </a:r>
             <a:endParaRPr lang="de-CH" dirty="0"/>
           </a:p>
@@ -3870,10 +4060,9 @@
           <a:lstStyle/>
           <a:p>
             <a:r>
-              <a:rPr lang="de-CH" dirty="0" smtClean="0"/>
-              <a:t>CRC Card</a:t>
-            </a:r>
-            <a:endParaRPr lang="de-CH" dirty="0"/>
+              <a:rPr lang="de-CH" dirty="0"/>
+              <a:t>CRC Card: Doctor</a:t>
+            </a:r>
           </a:p>
         </p:txBody>
       </p:sp>
@@ -3887,7 +4076,7 @@
             <p:ph idx="1"/>
             <p:extLst>
               <p:ext uri="{D42A27DB-BD31-4B8C-83A1-F6EECF244321}">
-                <p14:modId xmlns:p14="http://schemas.microsoft.com/office/powerpoint/2010/main" val="2642672682"/>
+                <p14:modId xmlns:p14="http://schemas.microsoft.com/office/powerpoint/2010/main" val="743235538"/>
               </p:ext>
             </p:extLst>
           </p:nvPr>
@@ -3903,8 +4092,20 @@
                 <a:tableStyleId>{5C22544A-7EE6-4342-B048-85BDC9FD1C3A}</a:tableStyleId>
               </a:tblPr>
               <a:tblGrid>
-                <a:gridCol w="5257220"/>
-                <a:gridCol w="5258380"/>
+                <a:gridCol w="5257220">
+                  <a:extLst>
+                    <a:ext uri="{9D8B030D-6E8A-4147-A177-3AD203B41FA5}">
+                      <a16:colId xmlns:a16="http://schemas.microsoft.com/office/drawing/2014/main" val="20000"/>
+                    </a:ext>
+                  </a:extLst>
+                </a:gridCol>
+                <a:gridCol w="5258380">
+                  <a:extLst>
+                    <a:ext uri="{9D8B030D-6E8A-4147-A177-3AD203B41FA5}">
+                      <a16:colId xmlns:a16="http://schemas.microsoft.com/office/drawing/2014/main" val="20001"/>
+                    </a:ext>
+                  </a:extLst>
+                </a:gridCol>
               </a:tblGrid>
               <a:tr h="0">
                 <a:tc gridSpan="2">
@@ -3917,13 +4118,10 @@
                           <a:spcPts val="0"/>
                         </a:spcAft>
                       </a:pPr>
-                      <a:r>
-                        <a:rPr lang="en-GB" sz="2400" dirty="0">
-                          <a:effectLst/>
-                        </a:rPr>
-                        <a:t>Class Name: Doctor</a:t>
-                      </a:r>
-                      <a:endParaRPr lang="de-CH" sz="2400" dirty="0">
+                      <a:endParaRPr lang="de-CH" sz="2400" b="1" kern="1200" dirty="0">
+                        <a:solidFill>
+                          <a:schemeClr val="lt1"/>
+                        </a:solidFill>
                         <a:effectLst/>
                         <a:latin typeface="Arial" panose="020B0604020202020204" pitchFamily="34" charset="0"/>
                         <a:ea typeface="Times New Roman" panose="02020603050405020304" pitchFamily="18" charset="0"/>
@@ -3943,6 +4141,11 @@
                   </a:txBody>
                   <a:tcPr/>
                 </a:tc>
+                <a:extLst>
+                  <a:ext uri="{0D108BD9-81ED-4DB2-BD59-A6C34878D82A}">
+                    <a16:rowId xmlns:a16="http://schemas.microsoft.com/office/drawing/2014/main" val="10000"/>
+                  </a:ext>
+                </a:extLst>
               </a:tr>
               <a:tr h="0">
                 <a:tc gridSpan="2">
@@ -3981,6 +4184,11 @@
                   </a:txBody>
                   <a:tcPr/>
                 </a:tc>
+                <a:extLst>
+                  <a:ext uri="{0D108BD9-81ED-4DB2-BD59-A6C34878D82A}">
+                    <a16:rowId xmlns:a16="http://schemas.microsoft.com/office/drawing/2014/main" val="10001"/>
+                  </a:ext>
+                </a:extLst>
               </a:tr>
               <a:tr h="0">
                 <a:tc>
@@ -4249,6 +4457,11 @@
                   </a:txBody>
                   <a:tcPr marL="68580" marR="68580" marT="0" marB="0"/>
                 </a:tc>
+                <a:extLst>
+                  <a:ext uri="{0D108BD9-81ED-4DB2-BD59-A6C34878D82A}">
+                    <a16:rowId xmlns:a16="http://schemas.microsoft.com/office/drawing/2014/main" val="10002"/>
+                  </a:ext>
+                </a:extLst>
               </a:tr>
             </a:tbl>
           </a:graphicData>
@@ -4284,49 +4497,1026 @@
           <a:chExt cx="0" cy="0"/>
         </a:xfrm>
       </p:grpSpPr>
+      <p:sp>
+        <p:nvSpPr>
+          <p:cNvPr id="5" name="Titel 4"/>
+          <p:cNvSpPr>
+            <a:spLocks noGrp="1"/>
+          </p:cNvSpPr>
+          <p:nvPr>
+            <p:ph type="title"/>
+          </p:nvPr>
+        </p:nvSpPr>
+        <p:spPr/>
+        <p:txBody>
+          <a:bodyPr/>
+          <a:lstStyle/>
+          <a:p>
+            <a:r>
+              <a:rPr lang="de-CH" dirty="0"/>
+              <a:t>CRC Card: Report</a:t>
+            </a:r>
+          </a:p>
+        </p:txBody>
+      </p:sp>
+      <p:graphicFrame>
+        <p:nvGraphicFramePr>
+          <p:cNvPr id="7" name="Inhaltsplatzhalter 6"/>
+          <p:cNvGraphicFramePr>
+            <a:graphicFrameLocks noGrp="1"/>
+          </p:cNvGraphicFramePr>
+          <p:nvPr>
+            <p:ph idx="1"/>
+            <p:extLst>
+              <p:ext uri="{D42A27DB-BD31-4B8C-83A1-F6EECF244321}">
+                <p14:modId xmlns:p14="http://schemas.microsoft.com/office/powerpoint/2010/main" val="1983711998"/>
+              </p:ext>
+            </p:extLst>
+          </p:nvPr>
+        </p:nvGraphicFramePr>
+        <p:xfrm>
+          <a:off x="838200" y="1690688"/>
+          <a:ext cx="10515600" cy="3657600"/>
+        </p:xfrm>
+        <a:graphic>
+          <a:graphicData uri="http://schemas.openxmlformats.org/drawingml/2006/table">
+            <a:tbl>
+              <a:tblPr firstRow="1" firstCol="1" bandRow="1">
+                <a:tableStyleId>{5C22544A-7EE6-4342-B048-85BDC9FD1C3A}</a:tableStyleId>
+              </a:tblPr>
+              <a:tblGrid>
+                <a:gridCol w="5257220">
+                  <a:extLst>
+                    <a:ext uri="{9D8B030D-6E8A-4147-A177-3AD203B41FA5}">
+                      <a16:colId xmlns:a16="http://schemas.microsoft.com/office/drawing/2014/main" val="20000"/>
+                    </a:ext>
+                  </a:extLst>
+                </a:gridCol>
+                <a:gridCol w="5258380">
+                  <a:extLst>
+                    <a:ext uri="{9D8B030D-6E8A-4147-A177-3AD203B41FA5}">
+                      <a16:colId xmlns:a16="http://schemas.microsoft.com/office/drawing/2014/main" val="20001"/>
+                    </a:ext>
+                  </a:extLst>
+                </a:gridCol>
+              </a:tblGrid>
+              <a:tr h="0">
+                <a:tc gridSpan="2">
+                  <a:txBody>
+                    <a:bodyPr/>
+                    <a:lstStyle/>
+                    <a:p>
+                      <a:pPr>
+                        <a:spcAft>
+                          <a:spcPts val="0"/>
+                        </a:spcAft>
+                      </a:pPr>
+                      <a:endParaRPr lang="de-CH" sz="2400" b="1" kern="1200" dirty="0">
+                        <a:solidFill>
+                          <a:schemeClr val="lt1"/>
+                        </a:solidFill>
+                        <a:effectLst/>
+                        <a:latin typeface="Arial" panose="020B0604020202020204" pitchFamily="34" charset="0"/>
+                        <a:ea typeface="Times New Roman" panose="02020603050405020304" pitchFamily="18" charset="0"/>
+                        <a:cs typeface="Times New Roman" panose="02020603050405020304" pitchFamily="18" charset="0"/>
+                      </a:endParaRPr>
+                    </a:p>
+                  </a:txBody>
+                  <a:tcPr marL="68580" marR="68580" marT="0" marB="0"/>
+                </a:tc>
+                <a:tc hMerge="1">
+                  <a:txBody>
+                    <a:bodyPr/>
+                    <a:lstStyle/>
+                    <a:p>
+                      <a:endParaRPr lang="de-CH"/>
+                    </a:p>
+                  </a:txBody>
+                  <a:tcPr/>
+                </a:tc>
+                <a:extLst>
+                  <a:ext uri="{0D108BD9-81ED-4DB2-BD59-A6C34878D82A}">
+                    <a16:rowId xmlns:a16="http://schemas.microsoft.com/office/drawing/2014/main" val="10000"/>
+                  </a:ext>
+                </a:extLst>
+              </a:tr>
+              <a:tr h="0">
+                <a:tc gridSpan="2">
+                  <a:txBody>
+                    <a:bodyPr/>
+                    <a:lstStyle/>
+                    <a:p>
+                      <a:pPr>
+                        <a:spcAft>
+                          <a:spcPts val="0"/>
+                        </a:spcAft>
+                      </a:pPr>
+                      <a:r>
+                        <a:rPr lang="en-GB" sz="2400" dirty="0">
+                          <a:effectLst/>
+                        </a:rPr>
+                        <a:t>Purpose: Encapsulates attributes and functions of a report.</a:t>
+                      </a:r>
+                      <a:endParaRPr lang="de-CH" sz="2400" dirty="0">
+                        <a:effectLst/>
+                        <a:latin typeface="Liberation Serif"/>
+                        <a:ea typeface="Droid Sans Fallback"/>
+                        <a:cs typeface="FreeSans"/>
+                      </a:endParaRPr>
+                    </a:p>
+                  </a:txBody>
+                  <a:tcPr marL="68580" marR="68580" marT="0" marB="0"/>
+                </a:tc>
+                <a:tc hMerge="1">
+                  <a:txBody>
+                    <a:bodyPr/>
+                    <a:lstStyle/>
+                    <a:p>
+                      <a:endParaRPr lang="de-CH"/>
+                    </a:p>
+                  </a:txBody>
+                  <a:tcPr/>
+                </a:tc>
+                <a:extLst>
+                  <a:ext uri="{0D108BD9-81ED-4DB2-BD59-A6C34878D82A}">
+                    <a16:rowId xmlns:a16="http://schemas.microsoft.com/office/drawing/2014/main" val="10001"/>
+                  </a:ext>
+                </a:extLst>
+              </a:tr>
+              <a:tr h="0">
+                <a:tc>
+                  <a:txBody>
+                    <a:bodyPr/>
+                    <a:lstStyle/>
+                    <a:p>
+                      <a:pPr>
+                        <a:spcAft>
+                          <a:spcPts val="0"/>
+                        </a:spcAft>
+                      </a:pPr>
+                      <a:r>
+                        <a:rPr lang="de-CH" sz="2400" dirty="0">
+                          <a:effectLst/>
+                        </a:rPr>
+                        <a:t>Responsiblities:</a:t>
+                      </a:r>
+                    </a:p>
+                    <a:p>
+                      <a:pPr marL="342900" lvl="0" indent="-342900">
+                        <a:spcAft>
+                          <a:spcPts val="0"/>
+                        </a:spcAft>
+                        <a:buFont typeface="Symbol" panose="05050102010706020507" pitchFamily="18" charset="2"/>
+                        <a:buChar char=""/>
+                        <a:tabLst>
+                          <a:tab pos="457200" algn="l"/>
+                        </a:tabLst>
+                      </a:pPr>
+                      <a:r>
+                        <a:rPr lang="de-CH" sz="2400" dirty="0">
+                          <a:effectLst/>
+                        </a:rPr>
+                        <a:t>Knows patient</a:t>
+                      </a:r>
+                    </a:p>
+                    <a:p>
+                      <a:pPr marL="342900" lvl="0" indent="-342900">
+                        <a:spcAft>
+                          <a:spcPts val="0"/>
+                        </a:spcAft>
+                        <a:buFont typeface="Symbol" panose="05050102010706020507" pitchFamily="18" charset="2"/>
+                        <a:buChar char=""/>
+                        <a:tabLst>
+                          <a:tab pos="457200" algn="l"/>
+                        </a:tabLst>
+                      </a:pPr>
+                      <a:r>
+                        <a:rPr lang="de-CH" sz="2400" dirty="0">
+                          <a:effectLst/>
+                        </a:rPr>
+                        <a:t>Knows MedicalRecord</a:t>
+                      </a:r>
+                    </a:p>
+                    <a:p>
+                      <a:pPr marL="342900" lvl="0" indent="-342900">
+                        <a:spcAft>
+                          <a:spcPts val="0"/>
+                        </a:spcAft>
+                        <a:buFont typeface="Symbol" panose="05050102010706020507" pitchFamily="18" charset="2"/>
+                        <a:buChar char=""/>
+                        <a:tabLst>
+                          <a:tab pos="457200" algn="l"/>
+                        </a:tabLst>
+                      </a:pPr>
+                      <a:r>
+                        <a:rPr lang="de-CH" sz="2400" dirty="0">
+                          <a:effectLst/>
+                        </a:rPr>
+                        <a:t>Knows the treating doctor</a:t>
+                      </a:r>
+                    </a:p>
+                    <a:p>
+                      <a:pPr marL="342900" lvl="0" indent="-342900">
+                        <a:spcAft>
+                          <a:spcPts val="0"/>
+                        </a:spcAft>
+                        <a:buFont typeface="Symbol" panose="05050102010706020507" pitchFamily="18" charset="2"/>
+                        <a:buChar char=""/>
+                        <a:tabLst>
+                          <a:tab pos="457200" algn="l"/>
+                        </a:tabLst>
+                      </a:pPr>
+                      <a:r>
+                        <a:rPr lang="de-CH" sz="2400" dirty="0">
+                          <a:effectLst/>
+                        </a:rPr>
+                        <a:t>Knows the author</a:t>
+                      </a:r>
+                    </a:p>
+                    <a:p>
+                      <a:pPr marL="342900" lvl="0" indent="-342900">
+                        <a:spcAft>
+                          <a:spcPts val="0"/>
+                        </a:spcAft>
+                        <a:buFont typeface="Symbol" panose="05050102010706020507" pitchFamily="18" charset="2"/>
+                        <a:buChar char=""/>
+                        <a:tabLst>
+                          <a:tab pos="457200" algn="l"/>
+                        </a:tabLst>
+                      </a:pPr>
+                      <a:r>
+                        <a:rPr lang="en-GB" sz="2400" dirty="0">
+                          <a:effectLst/>
+                        </a:rPr>
+                        <a:t>Knows Session -&gt; Event in Timetable it corresponds to.</a:t>
+                      </a:r>
+                      <a:endParaRPr lang="de-CH" sz="2400" dirty="0">
+                        <a:effectLst/>
+                      </a:endParaRPr>
+                    </a:p>
+                    <a:p>
+                      <a:pPr marL="342900" lvl="0" indent="-342900">
+                        <a:spcAft>
+                          <a:spcPts val="0"/>
+                        </a:spcAft>
+                        <a:buFont typeface="Symbol" panose="05050102010706020507" pitchFamily="18" charset="2"/>
+                        <a:buChar char=""/>
+                        <a:tabLst>
+                          <a:tab pos="457200" algn="l"/>
+                        </a:tabLst>
+                      </a:pPr>
+                      <a:r>
+                        <a:rPr lang="en-GB" sz="2400" dirty="0">
+                          <a:effectLst/>
+                        </a:rPr>
+                        <a:t>Knows notes made during session.</a:t>
+                      </a:r>
+                      <a:endParaRPr lang="de-CH" sz="2400" dirty="0">
+                        <a:effectLst/>
+                        <a:latin typeface="Liberation Serif"/>
+                        <a:ea typeface="Droid Sans Fallback"/>
+                        <a:cs typeface="Symbol" panose="05050102010706020507" pitchFamily="18" charset="2"/>
+                      </a:endParaRPr>
+                    </a:p>
+                  </a:txBody>
+                  <a:tcPr marL="68580" marR="68580" marT="0" marB="0"/>
+                </a:tc>
+                <a:tc>
+                  <a:txBody>
+                    <a:bodyPr/>
+                    <a:lstStyle/>
+                    <a:p>
+                      <a:pPr>
+                        <a:spcAft>
+                          <a:spcPts val="0"/>
+                        </a:spcAft>
+                      </a:pPr>
+                      <a:r>
+                        <a:rPr lang="de-CH" sz="2400" dirty="0">
+                          <a:effectLst/>
+                        </a:rPr>
+                        <a:t>Collaborators:</a:t>
+                      </a:r>
+                    </a:p>
+                    <a:p>
+                      <a:pPr marL="342900" lvl="0" indent="-342900">
+                        <a:spcAft>
+                          <a:spcPts val="0"/>
+                        </a:spcAft>
+                        <a:buFont typeface="Symbol" panose="05050102010706020507" pitchFamily="18" charset="2"/>
+                        <a:buChar char=""/>
+                        <a:tabLst>
+                          <a:tab pos="457200" algn="l"/>
+                        </a:tabLst>
+                      </a:pPr>
+                      <a:r>
+                        <a:rPr lang="en-US" sz="2400" dirty="0">
+                          <a:effectLst/>
+                        </a:rPr>
+                        <a:t>Is linked to a session.</a:t>
+                      </a:r>
+                      <a:endParaRPr lang="de-CH" sz="2400" dirty="0">
+                        <a:effectLst/>
+                      </a:endParaRPr>
+                    </a:p>
+                    <a:p>
+                      <a:pPr marL="457200">
+                        <a:spcAft>
+                          <a:spcPts val="0"/>
+                        </a:spcAft>
+                      </a:pPr>
+                      <a:r>
+                        <a:rPr lang="en-GB" sz="2400" dirty="0">
+                          <a:effectLst/>
+                        </a:rPr>
+                        <a:t> </a:t>
+                      </a:r>
+                      <a:endParaRPr lang="de-CH" sz="2400" dirty="0">
+                        <a:effectLst/>
+                        <a:latin typeface="Arial" panose="020B0604020202020204" pitchFamily="34" charset="0"/>
+                        <a:ea typeface="Times New Roman" panose="02020603050405020304" pitchFamily="18" charset="0"/>
+                        <a:cs typeface="Times New Roman" panose="02020603050405020304" pitchFamily="18" charset="0"/>
+                      </a:endParaRPr>
+                    </a:p>
+                  </a:txBody>
+                  <a:tcPr marL="68580" marR="68580" marT="0" marB="0"/>
+                </a:tc>
+                <a:extLst>
+                  <a:ext uri="{0D108BD9-81ED-4DB2-BD59-A6C34878D82A}">
+                    <a16:rowId xmlns:a16="http://schemas.microsoft.com/office/drawing/2014/main" val="10002"/>
+                  </a:ext>
+                </a:extLst>
+              </a:tr>
+            </a:tbl>
+          </a:graphicData>
+        </a:graphic>
+      </p:graphicFrame>
+    </p:spTree>
+    <p:extLst>
+      <p:ext uri="{BB962C8B-B14F-4D97-AF65-F5344CB8AC3E}">
+        <p14:creationId xmlns:p14="http://schemas.microsoft.com/office/powerpoint/2010/main" val="1089179464"/>
+      </p:ext>
+    </p:extLst>
+  </p:cSld>
+  <p:clrMapOvr>
+    <a:masterClrMapping/>
+  </p:clrMapOvr>
+</p:sld>
+</file>
+
+<file path=ppt/slides/slide6.xml><?xml version="1.0" encoding="utf-8"?>
+<p:sld xmlns:a="http://schemas.openxmlformats.org/drawingml/2006/main" xmlns:r="http://schemas.openxmlformats.org/officeDocument/2006/relationships" xmlns:p="http://schemas.openxmlformats.org/presentationml/2006/main">
+  <p:cSld>
+    <p:spTree>
+      <p:nvGrpSpPr>
+        <p:cNvPr id="1" name=""/>
+        <p:cNvGrpSpPr/>
+        <p:nvPr/>
+      </p:nvGrpSpPr>
+      <p:grpSpPr>
+        <a:xfrm>
+          <a:off x="0" y="0"/>
+          <a:ext cx="0" cy="0"/>
+          <a:chOff x="0" y="0"/>
+          <a:chExt cx="0" cy="0"/>
+        </a:xfrm>
+      </p:grpSpPr>
+      <p:sp>
+        <p:nvSpPr>
+          <p:cNvPr id="5" name="Titel 4"/>
+          <p:cNvSpPr>
+            <a:spLocks noGrp="1"/>
+          </p:cNvSpPr>
+          <p:nvPr>
+            <p:ph type="title"/>
+          </p:nvPr>
+        </p:nvSpPr>
+        <p:spPr/>
+        <p:txBody>
+          <a:bodyPr/>
+          <a:lstStyle/>
+          <a:p>
+            <a:r>
+              <a:rPr lang="de-CH" dirty="0"/>
+              <a:t>CRC Card: </a:t>
+            </a:r>
+            <a:r>
+              <a:rPr lang="en-US" dirty="0"/>
+              <a:t>Medication</a:t>
+            </a:r>
+            <a:endParaRPr lang="de-CH" dirty="0"/>
+          </a:p>
+        </p:txBody>
+      </p:sp>
+      <p:graphicFrame>
+        <p:nvGraphicFramePr>
+          <p:cNvPr id="7" name="Inhaltsplatzhalter 6"/>
+          <p:cNvGraphicFramePr>
+            <a:graphicFrameLocks noGrp="1"/>
+          </p:cNvGraphicFramePr>
+          <p:nvPr>
+            <p:ph idx="1"/>
+            <p:extLst/>
+          </p:nvPr>
+        </p:nvGraphicFramePr>
+        <p:xfrm>
+          <a:off x="838200" y="1690688"/>
+          <a:ext cx="10515600" cy="3291840"/>
+        </p:xfrm>
+        <a:graphic>
+          <a:graphicData uri="http://schemas.openxmlformats.org/drawingml/2006/table">
+            <a:tbl>
+              <a:tblPr firstRow="1" firstCol="1" bandRow="1">
+                <a:tableStyleId>{5C22544A-7EE6-4342-B048-85BDC9FD1C3A}</a:tableStyleId>
+              </a:tblPr>
+              <a:tblGrid>
+                <a:gridCol w="5257220">
+                  <a:extLst>
+                    <a:ext uri="{9D8B030D-6E8A-4147-A177-3AD203B41FA5}">
+                      <a16:colId xmlns:a16="http://schemas.microsoft.com/office/drawing/2014/main" val="20000"/>
+                    </a:ext>
+                  </a:extLst>
+                </a:gridCol>
+                <a:gridCol w="5258380">
+                  <a:extLst>
+                    <a:ext uri="{9D8B030D-6E8A-4147-A177-3AD203B41FA5}">
+                      <a16:colId xmlns:a16="http://schemas.microsoft.com/office/drawing/2014/main" val="20001"/>
+                    </a:ext>
+                  </a:extLst>
+                </a:gridCol>
+              </a:tblGrid>
+              <a:tr h="0">
+                <a:tc gridSpan="2">
+                  <a:txBody>
+                    <a:bodyPr/>
+                    <a:lstStyle/>
+                    <a:p>
+                      <a:pPr>
+                        <a:spcAft>
+                          <a:spcPts val="0"/>
+                        </a:spcAft>
+                      </a:pPr>
+                      <a:endParaRPr lang="de-CH" sz="2400" b="1" kern="1200" dirty="0">
+                        <a:solidFill>
+                          <a:schemeClr val="lt1"/>
+                        </a:solidFill>
+                        <a:effectLst/>
+                        <a:latin typeface="Arial" panose="020B0604020202020204" pitchFamily="34" charset="0"/>
+                        <a:ea typeface="Times New Roman" panose="02020603050405020304" pitchFamily="18" charset="0"/>
+                        <a:cs typeface="Times New Roman" panose="02020603050405020304" pitchFamily="18" charset="0"/>
+                      </a:endParaRPr>
+                    </a:p>
+                  </a:txBody>
+                  <a:tcPr marL="68580" marR="68580" marT="0" marB="0"/>
+                </a:tc>
+                <a:tc hMerge="1">
+                  <a:txBody>
+                    <a:bodyPr/>
+                    <a:lstStyle/>
+                    <a:p>
+                      <a:endParaRPr lang="de-CH"/>
+                    </a:p>
+                  </a:txBody>
+                  <a:tcPr/>
+                </a:tc>
+                <a:extLst>
+                  <a:ext uri="{0D108BD9-81ED-4DB2-BD59-A6C34878D82A}">
+                    <a16:rowId xmlns:a16="http://schemas.microsoft.com/office/drawing/2014/main" val="10000"/>
+                  </a:ext>
+                </a:extLst>
+              </a:tr>
+              <a:tr h="0">
+                <a:tc gridSpan="2">
+                  <a:txBody>
+                    <a:bodyPr/>
+                    <a:lstStyle/>
+                    <a:p>
+                      <a:pPr>
+                        <a:spcAft>
+                          <a:spcPts val="0"/>
+                        </a:spcAft>
+                      </a:pPr>
+                      <a:r>
+                        <a:rPr lang="en-GB" sz="2400" dirty="0">
+                          <a:effectLst/>
+                        </a:rPr>
+                        <a:t>Purpose: To store all medication per patient.</a:t>
+                      </a:r>
+                      <a:endParaRPr lang="de-CH" sz="2400" dirty="0">
+                        <a:effectLst/>
+                        <a:latin typeface="Arial" panose="020B0604020202020204" pitchFamily="34" charset="0"/>
+                        <a:ea typeface="Times New Roman" panose="02020603050405020304" pitchFamily="18" charset="0"/>
+                        <a:cs typeface="Times New Roman" panose="02020603050405020304" pitchFamily="18" charset="0"/>
+                      </a:endParaRPr>
+                    </a:p>
+                  </a:txBody>
+                  <a:tcPr marL="68580" marR="68580" marT="0" marB="0"/>
+                </a:tc>
+                <a:tc hMerge="1">
+                  <a:txBody>
+                    <a:bodyPr/>
+                    <a:lstStyle/>
+                    <a:p>
+                      <a:endParaRPr lang="de-CH"/>
+                    </a:p>
+                  </a:txBody>
+                  <a:tcPr/>
+                </a:tc>
+                <a:extLst>
+                  <a:ext uri="{0D108BD9-81ED-4DB2-BD59-A6C34878D82A}">
+                    <a16:rowId xmlns:a16="http://schemas.microsoft.com/office/drawing/2014/main" val="10001"/>
+                  </a:ext>
+                </a:extLst>
+              </a:tr>
+              <a:tr h="0">
+                <a:tc>
+                  <a:txBody>
+                    <a:bodyPr/>
+                    <a:lstStyle/>
+                    <a:p>
+                      <a:pPr>
+                        <a:spcAft>
+                          <a:spcPts val="0"/>
+                        </a:spcAft>
+                      </a:pPr>
+                      <a:r>
+                        <a:rPr lang="en-GB" sz="2400" dirty="0">
+                          <a:effectLst/>
+                        </a:rPr>
+                        <a:t>Responsibilities:</a:t>
+                      </a:r>
+                      <a:endParaRPr lang="de-CH" sz="2400" dirty="0">
+                        <a:effectLst/>
+                      </a:endParaRPr>
+                    </a:p>
+                    <a:p>
+                      <a:pPr marL="342900" lvl="0" indent="-342900">
+                        <a:spcAft>
+                          <a:spcPts val="0"/>
+                        </a:spcAft>
+                        <a:buFont typeface="Symbol" panose="05050102010706020507" pitchFamily="18" charset="2"/>
+                        <a:buChar char=""/>
+                      </a:pPr>
+                      <a:r>
+                        <a:rPr lang="en-GB" sz="2400" dirty="0">
+                          <a:effectLst/>
+                        </a:rPr>
+                        <a:t>Knows patient</a:t>
+                      </a:r>
+                      <a:endParaRPr lang="de-CH" sz="2400" dirty="0">
+                        <a:effectLst/>
+                      </a:endParaRPr>
+                    </a:p>
+                    <a:p>
+                      <a:pPr marL="342900" lvl="0" indent="-342900">
+                        <a:spcAft>
+                          <a:spcPts val="0"/>
+                        </a:spcAft>
+                        <a:buFont typeface="Symbol" panose="05050102010706020507" pitchFamily="18" charset="2"/>
+                        <a:buChar char=""/>
+                      </a:pPr>
+                      <a:r>
+                        <a:rPr lang="en-GB" sz="2400" dirty="0">
+                          <a:effectLst/>
+                        </a:rPr>
+                        <a:t>Knows Prescription</a:t>
+                      </a:r>
+                      <a:endParaRPr lang="de-CH" sz="2400" dirty="0">
+                        <a:effectLst/>
+                      </a:endParaRPr>
+                    </a:p>
+                    <a:p>
+                      <a:pPr marL="342900" lvl="0" indent="-342900">
+                        <a:spcAft>
+                          <a:spcPts val="0"/>
+                        </a:spcAft>
+                        <a:buFont typeface="Symbol" panose="05050102010706020507" pitchFamily="18" charset="2"/>
+                        <a:buChar char=""/>
+                      </a:pPr>
+                      <a:r>
+                        <a:rPr lang="en-GB" sz="2400" dirty="0">
+                          <a:effectLst/>
+                        </a:rPr>
+                        <a:t>Knows prescription interval</a:t>
+                      </a:r>
+                      <a:endParaRPr lang="de-CH" sz="2400" dirty="0">
+                        <a:effectLst/>
+                      </a:endParaRPr>
+                    </a:p>
+                    <a:p>
+                      <a:pPr marL="342900" lvl="0" indent="-342900">
+                        <a:spcAft>
+                          <a:spcPts val="0"/>
+                        </a:spcAft>
+                        <a:buFont typeface="Symbol" panose="05050102010706020507" pitchFamily="18" charset="2"/>
+                        <a:buChar char=""/>
+                      </a:pPr>
+                      <a:r>
+                        <a:rPr lang="en-GB" sz="2400" dirty="0">
+                          <a:effectLst/>
+                        </a:rPr>
+                        <a:t>Medication can validate its self (dosage / interaction)</a:t>
+                      </a:r>
+                      <a:endParaRPr lang="de-CH" sz="2400" dirty="0">
+                        <a:effectLst/>
+                      </a:endParaRPr>
+                    </a:p>
+                    <a:p>
+                      <a:pPr marL="342900" lvl="0" indent="-342900">
+                        <a:spcAft>
+                          <a:spcPts val="0"/>
+                        </a:spcAft>
+                        <a:buFont typeface="Symbol" panose="05050102010706020507" pitchFamily="18" charset="2"/>
+                        <a:buChar char=""/>
+                      </a:pPr>
+                      <a:r>
+                        <a:rPr lang="en-GB" sz="2400" dirty="0">
+                          <a:effectLst/>
+                        </a:rPr>
+                        <a:t>Knows Price</a:t>
+                      </a:r>
+                      <a:endParaRPr lang="de-CH" sz="2400" dirty="0">
+                        <a:effectLst/>
+                      </a:endParaRPr>
+                    </a:p>
+                  </a:txBody>
+                  <a:tcPr marL="68580" marR="68580" marT="0" marB="0"/>
+                </a:tc>
+                <a:tc>
+                  <a:txBody>
+                    <a:bodyPr/>
+                    <a:lstStyle/>
+                    <a:p>
+                      <a:pPr>
+                        <a:spcAft>
+                          <a:spcPts val="0"/>
+                        </a:spcAft>
+                      </a:pPr>
+                      <a:r>
+                        <a:rPr lang="en-GB" sz="2400" dirty="0">
+                          <a:effectLst/>
+                        </a:rPr>
+                        <a:t>Collaborators:</a:t>
+                      </a:r>
+                      <a:endParaRPr lang="de-CH" sz="2400" dirty="0">
+                        <a:effectLst/>
+                      </a:endParaRPr>
+                    </a:p>
+                    <a:p>
+                      <a:pPr marL="342900" lvl="0" indent="-342900">
+                        <a:spcAft>
+                          <a:spcPts val="0"/>
+                        </a:spcAft>
+                        <a:buFont typeface="Symbol" panose="05050102010706020507" pitchFamily="18" charset="2"/>
+                        <a:buChar char=""/>
+                      </a:pPr>
+                      <a:r>
+                        <a:rPr lang="en-GB" sz="2400" dirty="0">
+                          <a:effectLst/>
+                        </a:rPr>
+                        <a:t>Belongs to a patient</a:t>
+                      </a:r>
+                      <a:endParaRPr lang="de-CH" sz="2400" dirty="0">
+                        <a:effectLst/>
+                        <a:latin typeface="Arial" panose="020B0604020202020204" pitchFamily="34" charset="0"/>
+                        <a:ea typeface="Times New Roman" panose="02020603050405020304" pitchFamily="18" charset="0"/>
+                        <a:cs typeface="Times New Roman" panose="02020603050405020304" pitchFamily="18" charset="0"/>
+                      </a:endParaRPr>
+                    </a:p>
+                    <a:p>
+                      <a:pPr marL="457200">
+                        <a:spcAft>
+                          <a:spcPts val="0"/>
+                        </a:spcAft>
+                      </a:pPr>
+                      <a:r>
+                        <a:rPr lang="en-GB" sz="2400" dirty="0">
+                          <a:effectLst/>
+                        </a:rPr>
+                        <a:t> </a:t>
+                      </a:r>
+                      <a:endParaRPr lang="de-CH" sz="2400" dirty="0">
+                        <a:effectLst/>
+                        <a:latin typeface="Arial" panose="020B0604020202020204" pitchFamily="34" charset="0"/>
+                        <a:ea typeface="Times New Roman" panose="02020603050405020304" pitchFamily="18" charset="0"/>
+                        <a:cs typeface="Times New Roman" panose="02020603050405020304" pitchFamily="18" charset="0"/>
+                      </a:endParaRPr>
+                    </a:p>
+                  </a:txBody>
+                  <a:tcPr marL="68580" marR="68580" marT="0" marB="0"/>
+                </a:tc>
+                <a:extLst>
+                  <a:ext uri="{0D108BD9-81ED-4DB2-BD59-A6C34878D82A}">
+                    <a16:rowId xmlns:a16="http://schemas.microsoft.com/office/drawing/2014/main" val="10002"/>
+                  </a:ext>
+                </a:extLst>
+              </a:tr>
+            </a:tbl>
+          </a:graphicData>
+        </a:graphic>
+      </p:graphicFrame>
+    </p:spTree>
+    <p:extLst>
+      <p:ext uri="{BB962C8B-B14F-4D97-AF65-F5344CB8AC3E}">
+        <p14:creationId xmlns:p14="http://schemas.microsoft.com/office/powerpoint/2010/main" val="4180462156"/>
+      </p:ext>
+    </p:extLst>
+  </p:cSld>
+  <p:clrMapOvr>
+    <a:masterClrMapping/>
+  </p:clrMapOvr>
+</p:sld>
+</file>
+
+<file path=ppt/slides/slide7.xml><?xml version="1.0" encoding="utf-8"?>
+<p:sld xmlns:a="http://schemas.openxmlformats.org/drawingml/2006/main" xmlns:r="http://schemas.openxmlformats.org/officeDocument/2006/relationships" xmlns:p="http://schemas.openxmlformats.org/presentationml/2006/main">
+  <p:cSld>
+    <p:spTree>
+      <p:nvGrpSpPr>
+        <p:cNvPr id="1" name=""/>
+        <p:cNvGrpSpPr/>
+        <p:nvPr/>
+      </p:nvGrpSpPr>
+      <p:grpSpPr>
+        <a:xfrm>
+          <a:off x="0" y="0"/>
+          <a:ext cx="0" cy="0"/>
+          <a:chOff x="0" y="0"/>
+          <a:chExt cx="0" cy="0"/>
+        </a:xfrm>
+      </p:grpSpPr>
       <p:pic>
         <p:nvPicPr>
-          <p:cNvPr id="1026" name="Picture 2" descr="Image result for geek and poke requirements"/>
+          <p:cNvPr id="6" name="Content Placeholder 5"/>
           <p:cNvPicPr>
-            <a:picLocks noChangeAspect="1" noChangeArrowheads="1"/>
+            <a:picLocks noGrp="1" noChangeAspect="1"/>
           </p:cNvPicPr>
-          <p:nvPr/>
+          <p:nvPr>
+            <p:ph idx="1"/>
+          </p:nvPr>
         </p:nvPicPr>
-        <p:blipFill rotWithShape="1">
-          <a:blip r:embed="rId2" cstate="print">
+        <p:blipFill>
+          <a:blip r:embed="rId2">
             <a:extLst>
               <a:ext uri="{28A0092B-C50C-407E-A947-70E740481C1C}">
                 <a14:useLocalDpi xmlns:a14="http://schemas.microsoft.com/office/drawing/2010/main" val="0"/>
               </a:ext>
             </a:extLst>
           </a:blip>
-          <a:srcRect t="14510"/>
+          <a:stretch>
+            <a:fillRect/>
+          </a:stretch>
+        </p:blipFill>
+        <p:spPr>
+          <a:xfrm>
+            <a:off x="479393" y="0"/>
+            <a:ext cx="10045837" cy="6782540"/>
+          </a:xfrm>
+        </p:spPr>
+      </p:pic>
+      <p:sp>
+        <p:nvSpPr>
+          <p:cNvPr id="2" name="Title 1"/>
+          <p:cNvSpPr>
+            <a:spLocks noGrp="1"/>
+          </p:cNvSpPr>
+          <p:nvPr>
+            <p:ph type="title"/>
+          </p:nvPr>
+        </p:nvSpPr>
+        <p:spPr>
+          <a:xfrm>
+            <a:off x="671171" y="223082"/>
+            <a:ext cx="2995307" cy="1325563"/>
+          </a:xfrm>
+        </p:spPr>
+        <p:txBody>
+          <a:bodyPr>
+            <a:normAutofit/>
+          </a:bodyPr>
+          <a:lstStyle/>
+          <a:p>
+            <a:r>
+              <a:rPr lang="en-US" sz="3600" dirty="0"/>
+              <a:t>Domain Model</a:t>
+            </a:r>
+            <a:endParaRPr lang="de-CH" sz="3600" dirty="0"/>
+          </a:p>
+        </p:txBody>
+      </p:sp>
+      <p:pic>
+        <p:nvPicPr>
+          <p:cNvPr id="7" name="Picture 6"/>
+          <p:cNvPicPr>
+            <a:picLocks noChangeAspect="1"/>
+          </p:cNvPicPr>
+          <p:nvPr/>
+        </p:nvPicPr>
+        <p:blipFill rotWithShape="1">
+          <a:blip r:embed="rId3">
+            <a:clrChange>
+              <a:clrFrom>
+                <a:srgbClr val="FFFFFF"/>
+              </a:clrFrom>
+              <a:clrTo>
+                <a:srgbClr val="FFFFFF">
+                  <a:alpha val="0"/>
+                </a:srgbClr>
+              </a:clrTo>
+            </a:clrChange>
+            <a:extLst>
+              <a:ext uri="{28A0092B-C50C-407E-A947-70E740481C1C}">
+                <a14:useLocalDpi xmlns:a14="http://schemas.microsoft.com/office/drawing/2010/main" val="0"/>
+              </a:ext>
+            </a:extLst>
+          </a:blip>
+          <a:srcRect t="54627"/>
           <a:stretch/>
         </p:blipFill>
-        <p:spPr bwMode="auto">
+        <p:spPr>
           <a:xfrm>
-            <a:off x="3817710" y="863600"/>
-            <a:ext cx="4524057" cy="5473020"/>
+            <a:off x="10856472" y="6120882"/>
+            <a:ext cx="1149096" cy="737118"/>
           </a:xfrm>
           <a:prstGeom prst="rect">
             <a:avLst/>
           </a:prstGeom>
-          <a:noFill/>
-          <a:extLst>
-            <a:ext uri="{909E8E84-426E-40DD-AFC4-6F175D3DCCD1}">
-              <a14:hiddenFill xmlns:a14="http://schemas.microsoft.com/office/drawing/2010/main">
-                <a:solidFill>
-                  <a:srgbClr val="FFFFFF"/>
-                </a:solidFill>
-              </a14:hiddenFill>
-            </a:ext>
-          </a:extLst>
         </p:spPr>
       </p:pic>
     </p:spTree>
     <p:extLst>
       <p:ext uri="{BB962C8B-B14F-4D97-AF65-F5344CB8AC3E}">
-        <p14:creationId xmlns:p14="http://schemas.microsoft.com/office/powerpoint/2010/main" val="742557996"/>
+        <p14:creationId xmlns:p14="http://schemas.microsoft.com/office/powerpoint/2010/main" val="2203930709"/>
+      </p:ext>
+    </p:extLst>
+  </p:cSld>
+  <p:clrMapOvr>
+    <a:masterClrMapping/>
+  </p:clrMapOvr>
+</p:sld>
+</file>
+
+<file path=ppt/slides/slide8.xml><?xml version="1.0" encoding="utf-8"?>
+<p:sld xmlns:a="http://schemas.openxmlformats.org/drawingml/2006/main" xmlns:r="http://schemas.openxmlformats.org/officeDocument/2006/relationships" xmlns:p="http://schemas.openxmlformats.org/presentationml/2006/main">
+  <p:cSld>
+    <p:spTree>
+      <p:nvGrpSpPr>
+        <p:cNvPr id="1" name=""/>
+        <p:cNvGrpSpPr/>
+        <p:nvPr/>
+      </p:nvGrpSpPr>
+      <p:grpSpPr>
+        <a:xfrm>
+          <a:off x="0" y="0"/>
+          <a:ext cx="0" cy="0"/>
+          <a:chOff x="0" y="0"/>
+          <a:chExt cx="0" cy="0"/>
+        </a:xfrm>
+      </p:grpSpPr>
+      <p:pic>
+        <p:nvPicPr>
+          <p:cNvPr id="4" name="Content Placeholder 3"/>
+          <p:cNvPicPr>
+            <a:picLocks noGrp="1" noChangeAspect="1"/>
+          </p:cNvPicPr>
+          <p:nvPr>
+            <p:ph idx="1"/>
+          </p:nvPr>
+        </p:nvPicPr>
+        <p:blipFill rotWithShape="1">
+          <a:blip r:embed="rId2"/>
+          <a:srcRect b="4836"/>
+          <a:stretch/>
+        </p:blipFill>
+        <p:spPr>
+          <a:xfrm>
+            <a:off x="66400" y="957707"/>
+            <a:ext cx="12059197" cy="5718301"/>
+          </a:xfrm>
+          <a:prstGeom prst="rect">
+            <a:avLst/>
+          </a:prstGeom>
+        </p:spPr>
+      </p:pic>
+      <p:sp>
+        <p:nvSpPr>
+          <p:cNvPr id="2" name="Title 1"/>
+          <p:cNvSpPr>
+            <a:spLocks noGrp="1"/>
+          </p:cNvSpPr>
+          <p:nvPr>
+            <p:ph type="title"/>
+          </p:nvPr>
+        </p:nvSpPr>
+        <p:spPr>
+          <a:xfrm>
+            <a:off x="838199" y="152061"/>
+            <a:ext cx="10515600" cy="1325563"/>
+          </a:xfrm>
+        </p:spPr>
+        <p:txBody>
+          <a:bodyPr/>
+          <a:lstStyle/>
+          <a:p>
+            <a:r>
+              <a:rPr lang="en-US" dirty="0"/>
+              <a:t>Sequence diagram</a:t>
+            </a:r>
+            <a:endParaRPr lang="de-CH" dirty="0"/>
+          </a:p>
+        </p:txBody>
+      </p:sp>
+    </p:spTree>
+    <p:extLst>
+      <p:ext uri="{BB962C8B-B14F-4D97-AF65-F5344CB8AC3E}">
+        <p14:creationId xmlns:p14="http://schemas.microsoft.com/office/powerpoint/2010/main" val="325176613"/>
+      </p:ext>
+    </p:extLst>
+  </p:cSld>
+  <p:clrMapOvr>
+    <a:masterClrMapping/>
+  </p:clrMapOvr>
+</p:sld>
+</file>
+
+<file path=ppt/slides/slide9.xml><?xml version="1.0" encoding="utf-8"?>
+<p:sld xmlns:a="http://schemas.openxmlformats.org/drawingml/2006/main" xmlns:r="http://schemas.openxmlformats.org/officeDocument/2006/relationships" xmlns:p="http://schemas.openxmlformats.org/presentationml/2006/main">
+  <p:cSld>
+    <p:spTree>
+      <p:nvGrpSpPr>
+        <p:cNvPr id="1" name=""/>
+        <p:cNvGrpSpPr/>
+        <p:nvPr/>
+      </p:nvGrpSpPr>
+      <p:grpSpPr>
+        <a:xfrm>
+          <a:off x="0" y="0"/>
+          <a:ext cx="0" cy="0"/>
+          <a:chOff x="0" y="0"/>
+          <a:chExt cx="0" cy="0"/>
+        </a:xfrm>
+      </p:grpSpPr>
+      <p:pic>
+        <p:nvPicPr>
+          <p:cNvPr id="4" name="Content Placeholder 3"/>
+          <p:cNvPicPr>
+            <a:picLocks noGrp="1" noChangeAspect="1"/>
+          </p:cNvPicPr>
+          <p:nvPr>
+            <p:ph idx="1"/>
+          </p:nvPr>
+        </p:nvPicPr>
+        <p:blipFill>
+          <a:blip r:embed="rId2">
+            <a:extLst>
+              <a:ext uri="{28A0092B-C50C-407E-A947-70E740481C1C}">
+                <a14:useLocalDpi xmlns:a14="http://schemas.microsoft.com/office/drawing/2010/main" val="0"/>
+              </a:ext>
+            </a:extLst>
+          </a:blip>
+          <a:stretch>
+            <a:fillRect/>
+          </a:stretch>
+        </p:blipFill>
+        <p:spPr>
+          <a:xfrm>
+            <a:off x="1949464" y="88780"/>
+            <a:ext cx="7775062" cy="6693763"/>
+          </a:xfrm>
+        </p:spPr>
+      </p:pic>
+      <p:sp>
+        <p:nvSpPr>
+          <p:cNvPr id="2" name="Title 1"/>
+          <p:cNvSpPr>
+            <a:spLocks noGrp="1"/>
+          </p:cNvSpPr>
+          <p:nvPr>
+            <p:ph type="title"/>
+          </p:nvPr>
+        </p:nvSpPr>
+        <p:spPr>
+          <a:xfrm>
+            <a:off x="3244048" y="88780"/>
+            <a:ext cx="10515600" cy="1325563"/>
+          </a:xfrm>
+        </p:spPr>
+        <p:txBody>
+          <a:bodyPr/>
+          <a:lstStyle/>
+          <a:p>
+            <a:r>
+              <a:rPr lang="en-US" dirty="0"/>
+              <a:t>Sequence diagram</a:t>
+            </a:r>
+            <a:endParaRPr lang="de-CH" dirty="0"/>
+          </a:p>
+        </p:txBody>
+      </p:sp>
+    </p:spTree>
+    <p:extLst>
+      <p:ext uri="{BB962C8B-B14F-4D97-AF65-F5344CB8AC3E}">
+        <p14:creationId xmlns:p14="http://schemas.microsoft.com/office/powerpoint/2010/main" val="1521717192"/>
       </p:ext>
     </p:extLst>
   </p:cSld>

</xml_diff>